<commit_message>
Added two mat files containing the samples for edge detection. Added another function create_net which will automate the process of creation, training and simulation of the neural network
</commit_message>
<xml_diff>
--- a/Presentation2_Proposed.pptx
+++ b/Presentation2_Proposed.pptx
@@ -1263,6 +1263,13 @@
         </dgm:presLayoutVars>
       </dgm:prSet>
       <dgm:spPr/>
+      <dgm:t>
+        <a:bodyPr/>
+        <a:lstStyle/>
+        <a:p>
+          <a:endParaRPr lang="en-US"/>
+        </a:p>
+      </dgm:t>
     </dgm:pt>
     <dgm:pt modelId="{A5328CC2-7313-45F6-88C9-A7D052A1A823}" type="pres">
       <dgm:prSet presAssocID="{5AC97B45-D950-4BA7-828F-A82426FC621B}" presName="hierFlow" presStyleCnt="0"/>
@@ -1289,6 +1296,13 @@
         </dgm:presLayoutVars>
       </dgm:prSet>
       <dgm:spPr/>
+      <dgm:t>
+        <a:bodyPr/>
+        <a:lstStyle/>
+        <a:p>
+          <a:endParaRPr lang="en-US"/>
+        </a:p>
+      </dgm:t>
     </dgm:pt>
     <dgm:pt modelId="{A7205568-17C7-400E-8598-EAC708A77453}" type="pres">
       <dgm:prSet presAssocID="{81ECDEF2-4B90-4768-BA63-4BE734E93C77}" presName="hierChild2" presStyleCnt="0"/>
@@ -1297,6 +1311,13 @@
     <dgm:pt modelId="{DBD886C5-46CD-46C1-AD1C-B39755644582}" type="pres">
       <dgm:prSet presAssocID="{9C33CFCA-6F5C-4680-9DBE-7CEAF0BA519D}" presName="Name19" presStyleLbl="parChTrans1D2" presStyleIdx="0" presStyleCnt="3"/>
       <dgm:spPr/>
+      <dgm:t>
+        <a:bodyPr/>
+        <a:lstStyle/>
+        <a:p>
+          <a:endParaRPr lang="en-US"/>
+        </a:p>
+      </dgm:t>
     </dgm:pt>
     <dgm:pt modelId="{67CC909F-E80F-40F1-815E-1C66768EC116}" type="pres">
       <dgm:prSet presAssocID="{4E048086-5913-4F96-8238-CBE7DCDA6106}" presName="Name21" presStyleCnt="0"/>
@@ -1305,6 +1326,13 @@
     <dgm:pt modelId="{D8E10F95-5756-4BAE-9CE6-4C01BEB7C029}" type="pres">
       <dgm:prSet presAssocID="{4E048086-5913-4F96-8238-CBE7DCDA6106}" presName="level2Shape" presStyleLbl="node2" presStyleIdx="0" presStyleCnt="3"/>
       <dgm:spPr/>
+      <dgm:t>
+        <a:bodyPr/>
+        <a:lstStyle/>
+        <a:p>
+          <a:endParaRPr lang="en-US"/>
+        </a:p>
+      </dgm:t>
     </dgm:pt>
     <dgm:pt modelId="{7BB3A0B6-C74A-4192-AE0D-E4AF52AAA62E}" type="pres">
       <dgm:prSet presAssocID="{4E048086-5913-4F96-8238-CBE7DCDA6106}" presName="hierChild3" presStyleCnt="0"/>
@@ -1313,6 +1341,13 @@
     <dgm:pt modelId="{418A27A6-8121-4F59-9426-10E1FE1C78E9}" type="pres">
       <dgm:prSet presAssocID="{583224E0-242D-4CF9-940B-1779D564971F}" presName="Name19" presStyleLbl="parChTrans1D2" presStyleIdx="1" presStyleCnt="3"/>
       <dgm:spPr/>
+      <dgm:t>
+        <a:bodyPr/>
+        <a:lstStyle/>
+        <a:p>
+          <a:endParaRPr lang="en-US"/>
+        </a:p>
+      </dgm:t>
     </dgm:pt>
     <dgm:pt modelId="{3B5AD160-C162-4BC0-A6E1-2EE1FB0EA809}" type="pres">
       <dgm:prSet presAssocID="{EA4E1945-2735-48C0-B456-38029D16B9F1}" presName="Name21" presStyleCnt="0"/>
@@ -1321,6 +1356,13 @@
     <dgm:pt modelId="{20ABA8FC-D466-427C-969F-B02B57D42E63}" type="pres">
       <dgm:prSet presAssocID="{EA4E1945-2735-48C0-B456-38029D16B9F1}" presName="level2Shape" presStyleLbl="node2" presStyleIdx="1" presStyleCnt="3"/>
       <dgm:spPr/>
+      <dgm:t>
+        <a:bodyPr/>
+        <a:lstStyle/>
+        <a:p>
+          <a:endParaRPr lang="en-US"/>
+        </a:p>
+      </dgm:t>
     </dgm:pt>
     <dgm:pt modelId="{3FEE263A-641A-4834-83C5-1BA970321A9F}" type="pres">
       <dgm:prSet presAssocID="{EA4E1945-2735-48C0-B456-38029D16B9F1}" presName="hierChild3" presStyleCnt="0"/>
@@ -1329,6 +1371,13 @@
     <dgm:pt modelId="{0BF74B1C-D790-4892-8A37-2BDDABDAD287}" type="pres">
       <dgm:prSet presAssocID="{1F18CF45-9EFF-4272-974C-667D3755D4F6}" presName="Name19" presStyleLbl="parChTrans1D2" presStyleIdx="2" presStyleCnt="3"/>
       <dgm:spPr/>
+      <dgm:t>
+        <a:bodyPr/>
+        <a:lstStyle/>
+        <a:p>
+          <a:endParaRPr lang="en-US"/>
+        </a:p>
+      </dgm:t>
     </dgm:pt>
     <dgm:pt modelId="{8E3F6C02-31C9-455B-9594-FBB372831CF5}" type="pres">
       <dgm:prSet presAssocID="{4CE06E46-0714-452F-AB24-C9C05FFE475F}" presName="Name21" presStyleCnt="0"/>
@@ -1337,6 +1386,13 @@
     <dgm:pt modelId="{5B4AD018-BEC7-46A6-BFBC-118D8896C537}" type="pres">
       <dgm:prSet presAssocID="{4CE06E46-0714-452F-AB24-C9C05FFE475F}" presName="level2Shape" presStyleLbl="node2" presStyleIdx="2" presStyleCnt="3"/>
       <dgm:spPr/>
+      <dgm:t>
+        <a:bodyPr/>
+        <a:lstStyle/>
+        <a:p>
+          <a:endParaRPr lang="en-US"/>
+        </a:p>
+      </dgm:t>
     </dgm:pt>
     <dgm:pt modelId="{23235256-1F7C-4D5B-A2B8-28AA37D50839}" type="pres">
       <dgm:prSet presAssocID="{4CE06E46-0714-452F-AB24-C9C05FFE475F}" presName="hierChild3" presStyleCnt="0"/>
@@ -1345,6 +1401,13 @@
     <dgm:pt modelId="{4D53EF7D-419E-47BC-BBFB-313FD2720112}" type="pres">
       <dgm:prSet presAssocID="{A5FC00B1-5AC9-4694-92A2-A3073E74A651}" presName="Name19" presStyleLbl="parChTrans1D3" presStyleIdx="0" presStyleCnt="2"/>
       <dgm:spPr/>
+      <dgm:t>
+        <a:bodyPr/>
+        <a:lstStyle/>
+        <a:p>
+          <a:endParaRPr lang="en-US"/>
+        </a:p>
+      </dgm:t>
     </dgm:pt>
     <dgm:pt modelId="{7BF6F37C-6766-42F5-AFE2-402D40712E03}" type="pres">
       <dgm:prSet presAssocID="{763F464C-1A9B-4A8A-BBB6-CB85F5083C00}" presName="Name21" presStyleCnt="0"/>
@@ -1353,6 +1416,13 @@
     <dgm:pt modelId="{78EA99FF-4FA2-482F-8478-CCDBA0159D67}" type="pres">
       <dgm:prSet presAssocID="{763F464C-1A9B-4A8A-BBB6-CB85F5083C00}" presName="level2Shape" presStyleLbl="node3" presStyleIdx="0" presStyleCnt="2"/>
       <dgm:spPr/>
+      <dgm:t>
+        <a:bodyPr/>
+        <a:lstStyle/>
+        <a:p>
+          <a:endParaRPr lang="en-US"/>
+        </a:p>
+      </dgm:t>
     </dgm:pt>
     <dgm:pt modelId="{DBBE0D31-E13B-49E0-9DDF-E3834DFD868D}" type="pres">
       <dgm:prSet presAssocID="{763F464C-1A9B-4A8A-BBB6-CB85F5083C00}" presName="hierChild3" presStyleCnt="0"/>
@@ -1361,6 +1431,13 @@
     <dgm:pt modelId="{D4A3543C-64F3-45AE-A144-EA2456DD0AF1}" type="pres">
       <dgm:prSet presAssocID="{42ED6FD1-9063-4FF4-B4E1-2D6CD09707DD}" presName="Name19" presStyleLbl="parChTrans1D4" presStyleIdx="0" presStyleCnt="4"/>
       <dgm:spPr/>
+      <dgm:t>
+        <a:bodyPr/>
+        <a:lstStyle/>
+        <a:p>
+          <a:endParaRPr lang="en-US"/>
+        </a:p>
+      </dgm:t>
     </dgm:pt>
     <dgm:pt modelId="{4B951E6F-A9B4-4868-9BA6-BAC9DF47EE34}" type="pres">
       <dgm:prSet presAssocID="{4E7D3B01-FC5C-43ED-802E-A887796C0252}" presName="Name21" presStyleCnt="0"/>
@@ -1369,6 +1446,13 @@
     <dgm:pt modelId="{D7509E2D-E65E-48EB-B3F9-2FA1D4D7A4AD}" type="pres">
       <dgm:prSet presAssocID="{4E7D3B01-FC5C-43ED-802E-A887796C0252}" presName="level2Shape" presStyleLbl="node4" presStyleIdx="0" presStyleCnt="4"/>
       <dgm:spPr/>
+      <dgm:t>
+        <a:bodyPr/>
+        <a:lstStyle/>
+        <a:p>
+          <a:endParaRPr lang="en-US"/>
+        </a:p>
+      </dgm:t>
     </dgm:pt>
     <dgm:pt modelId="{27598718-2734-4C1A-92D7-43C527FB4A95}" type="pres">
       <dgm:prSet presAssocID="{4E7D3B01-FC5C-43ED-802E-A887796C0252}" presName="hierChild3" presStyleCnt="0"/>
@@ -1377,6 +1461,13 @@
     <dgm:pt modelId="{1D6B99FC-F962-4ED1-92D5-81B5D69A4E76}" type="pres">
       <dgm:prSet presAssocID="{B6F1ECDF-70D7-40BD-83E0-7627B277D4C7}" presName="Name19" presStyleLbl="parChTrans1D4" presStyleIdx="1" presStyleCnt="4"/>
       <dgm:spPr/>
+      <dgm:t>
+        <a:bodyPr/>
+        <a:lstStyle/>
+        <a:p>
+          <a:endParaRPr lang="en-US"/>
+        </a:p>
+      </dgm:t>
     </dgm:pt>
     <dgm:pt modelId="{88716DF9-D317-4E10-8BC1-BE161D386471}" type="pres">
       <dgm:prSet presAssocID="{EC5B3B17-A8F1-4BF2-9088-0A1C3FFB265D}" presName="Name21" presStyleCnt="0"/>
@@ -1385,6 +1476,13 @@
     <dgm:pt modelId="{4126711B-B9E8-4AEE-9BCA-454D5ACBC510}" type="pres">
       <dgm:prSet presAssocID="{EC5B3B17-A8F1-4BF2-9088-0A1C3FFB265D}" presName="level2Shape" presStyleLbl="node4" presStyleIdx="1" presStyleCnt="4"/>
       <dgm:spPr/>
+      <dgm:t>
+        <a:bodyPr/>
+        <a:lstStyle/>
+        <a:p>
+          <a:endParaRPr lang="en-US"/>
+        </a:p>
+      </dgm:t>
     </dgm:pt>
     <dgm:pt modelId="{7592B9C2-975B-4A44-9E73-9D4912310F25}" type="pres">
       <dgm:prSet presAssocID="{EC5B3B17-A8F1-4BF2-9088-0A1C3FFB265D}" presName="hierChild3" presStyleCnt="0"/>
@@ -1393,6 +1491,13 @@
     <dgm:pt modelId="{787181F8-5A63-431D-85F7-58B8315AD782}" type="pres">
       <dgm:prSet presAssocID="{9C68AB92-3C8E-4E65-AC59-F9379CAB2C55}" presName="Name19" presStyleLbl="parChTrans1D4" presStyleIdx="2" presStyleCnt="4"/>
       <dgm:spPr/>
+      <dgm:t>
+        <a:bodyPr/>
+        <a:lstStyle/>
+        <a:p>
+          <a:endParaRPr lang="en-US"/>
+        </a:p>
+      </dgm:t>
     </dgm:pt>
     <dgm:pt modelId="{A6130077-10AF-425B-9216-50C798AFF585}" type="pres">
       <dgm:prSet presAssocID="{C8EF2319-5CDE-412F-8FF3-46525236DB5F}" presName="Name21" presStyleCnt="0"/>
@@ -1401,6 +1506,13 @@
     <dgm:pt modelId="{26A3F8A9-98B3-4798-BA80-C92EABA10744}" type="pres">
       <dgm:prSet presAssocID="{C8EF2319-5CDE-412F-8FF3-46525236DB5F}" presName="level2Shape" presStyleLbl="node4" presStyleIdx="2" presStyleCnt="4"/>
       <dgm:spPr/>
+      <dgm:t>
+        <a:bodyPr/>
+        <a:lstStyle/>
+        <a:p>
+          <a:endParaRPr lang="en-US"/>
+        </a:p>
+      </dgm:t>
     </dgm:pt>
     <dgm:pt modelId="{F1A78596-69EB-456B-9257-27CF71E56C50}" type="pres">
       <dgm:prSet presAssocID="{C8EF2319-5CDE-412F-8FF3-46525236DB5F}" presName="hierChild3" presStyleCnt="0"/>
@@ -1409,6 +1521,13 @@
     <dgm:pt modelId="{6227A3C8-2209-47E3-AC60-C97584B50E73}" type="pres">
       <dgm:prSet presAssocID="{66275E6C-84CD-4888-8FF9-934066A7EB89}" presName="Name19" presStyleLbl="parChTrans1D4" presStyleIdx="3" presStyleCnt="4"/>
       <dgm:spPr/>
+      <dgm:t>
+        <a:bodyPr/>
+        <a:lstStyle/>
+        <a:p>
+          <a:endParaRPr lang="en-US"/>
+        </a:p>
+      </dgm:t>
     </dgm:pt>
     <dgm:pt modelId="{CB3166C8-D125-490D-AD82-6C560D9C9C78}" type="pres">
       <dgm:prSet presAssocID="{FD73C3F3-1040-499D-ABEC-3E04D9DB5441}" presName="Name21" presStyleCnt="0"/>
@@ -1417,6 +1536,13 @@
     <dgm:pt modelId="{F2DC642D-F30C-4F22-98F6-87945A798FC4}" type="pres">
       <dgm:prSet presAssocID="{FD73C3F3-1040-499D-ABEC-3E04D9DB5441}" presName="level2Shape" presStyleLbl="node4" presStyleIdx="3" presStyleCnt="4"/>
       <dgm:spPr/>
+      <dgm:t>
+        <a:bodyPr/>
+        <a:lstStyle/>
+        <a:p>
+          <a:endParaRPr lang="en-US"/>
+        </a:p>
+      </dgm:t>
     </dgm:pt>
     <dgm:pt modelId="{AF15869B-391A-4792-87D9-3D2C4499F86F}" type="pres">
       <dgm:prSet presAssocID="{FD73C3F3-1040-499D-ABEC-3E04D9DB5441}" presName="hierChild3" presStyleCnt="0"/>
@@ -1425,6 +1551,13 @@
     <dgm:pt modelId="{56443105-A1ED-44FC-B993-AAA239C42BF6}" type="pres">
       <dgm:prSet presAssocID="{8B6DCE7E-8550-4F5F-9BA2-6ADCF23123CD}" presName="Name19" presStyleLbl="parChTrans1D3" presStyleIdx="1" presStyleCnt="2"/>
       <dgm:spPr/>
+      <dgm:t>
+        <a:bodyPr/>
+        <a:lstStyle/>
+        <a:p>
+          <a:endParaRPr lang="en-US"/>
+        </a:p>
+      </dgm:t>
     </dgm:pt>
     <dgm:pt modelId="{E70BF17C-7DE0-4F61-B207-C2F94EBEEB58}" type="pres">
       <dgm:prSet presAssocID="{58EF9AEA-4A68-40BD-8934-D010E5ED107A}" presName="Name21" presStyleCnt="0"/>
@@ -1433,6 +1566,13 @@
     <dgm:pt modelId="{54098387-CD4E-41A7-A8E9-76A35EBCE9BA}" type="pres">
       <dgm:prSet presAssocID="{58EF9AEA-4A68-40BD-8934-D010E5ED107A}" presName="level2Shape" presStyleLbl="node3" presStyleIdx="1" presStyleCnt="2"/>
       <dgm:spPr/>
+      <dgm:t>
+        <a:bodyPr/>
+        <a:lstStyle/>
+        <a:p>
+          <a:endParaRPr lang="en-US"/>
+        </a:p>
+      </dgm:t>
     </dgm:pt>
     <dgm:pt modelId="{B0B4B0C8-5BE4-4AF3-AFF2-B1A3E6D5F848}" type="pres">
       <dgm:prSet presAssocID="{58EF9AEA-4A68-40BD-8934-D010E5ED107A}" presName="hierChild3" presStyleCnt="0"/>
@@ -1444,36 +1584,36 @@
     </dgm:pt>
   </dgm:ptLst>
   <dgm:cxnLst>
+    <dgm:cxn modelId="{0E656B61-6B5A-451F-93A3-E05F7611F19F}" type="presOf" srcId="{4E7D3B01-FC5C-43ED-802E-A887796C0252}" destId="{D7509E2D-E65E-48EB-B3F9-2FA1D4D7A4AD}" srcOrd="0" destOrd="0" presId="urn:microsoft.com/office/officeart/2005/8/layout/hierarchy6"/>
+    <dgm:cxn modelId="{0D67976C-274B-4D2A-B610-2B6ECD925794}" type="presOf" srcId="{B6F1ECDF-70D7-40BD-83E0-7627B277D4C7}" destId="{1D6B99FC-F962-4ED1-92D5-81B5D69A4E76}" srcOrd="0" destOrd="0" presId="urn:microsoft.com/office/officeart/2005/8/layout/hierarchy6"/>
+    <dgm:cxn modelId="{1D96B10F-EFF9-489F-8EBE-A6DFAFD05C7A}" type="presOf" srcId="{42ED6FD1-9063-4FF4-B4E1-2D6CD09707DD}" destId="{D4A3543C-64F3-45AE-A144-EA2456DD0AF1}" srcOrd="0" destOrd="0" presId="urn:microsoft.com/office/officeart/2005/8/layout/hierarchy6"/>
+    <dgm:cxn modelId="{36996426-A526-4EF6-87C6-58D4AE717C3A}" srcId="{5AC97B45-D950-4BA7-828F-A82426FC621B}" destId="{81ECDEF2-4B90-4768-BA63-4BE734E93C77}" srcOrd="0" destOrd="0" parTransId="{B7B25871-225C-4884-8BEC-F9D608D91BB7}" sibTransId="{35E406F7-85DC-4D39-89B1-D3DD2C583D5A}"/>
+    <dgm:cxn modelId="{F77E2EA7-08B3-4134-A622-654B7F840859}" srcId="{81ECDEF2-4B90-4768-BA63-4BE734E93C77}" destId="{EA4E1945-2735-48C0-B456-38029D16B9F1}" srcOrd="1" destOrd="0" parTransId="{583224E0-242D-4CF9-940B-1779D564971F}" sibTransId="{B88E4A3A-A473-4AC4-BF58-42ECF85E90DF}"/>
+    <dgm:cxn modelId="{3C5A41EA-DFC1-4E69-BB31-57A05A8ECB21}" type="presOf" srcId="{8B6DCE7E-8550-4F5F-9BA2-6ADCF23123CD}" destId="{56443105-A1ED-44FC-B993-AAA239C42BF6}" srcOrd="0" destOrd="0" presId="urn:microsoft.com/office/officeart/2005/8/layout/hierarchy6"/>
+    <dgm:cxn modelId="{0E20935C-88AB-426B-93A9-8EACFC29B4FB}" type="presOf" srcId="{763F464C-1A9B-4A8A-BBB6-CB85F5083C00}" destId="{78EA99FF-4FA2-482F-8478-CCDBA0159D67}" srcOrd="0" destOrd="0" presId="urn:microsoft.com/office/officeart/2005/8/layout/hierarchy6"/>
+    <dgm:cxn modelId="{7475B711-D6EB-499C-8DE8-C6298C916C1B}" type="presOf" srcId="{1F18CF45-9EFF-4272-974C-667D3755D4F6}" destId="{0BF74B1C-D790-4892-8A37-2BDDABDAD287}" srcOrd="0" destOrd="0" presId="urn:microsoft.com/office/officeart/2005/8/layout/hierarchy6"/>
+    <dgm:cxn modelId="{F76B0E3F-AE77-482F-9725-C4252CD73107}" srcId="{4CE06E46-0714-452F-AB24-C9C05FFE475F}" destId="{58EF9AEA-4A68-40BD-8934-D010E5ED107A}" srcOrd="1" destOrd="0" parTransId="{8B6DCE7E-8550-4F5F-9BA2-6ADCF23123CD}" sibTransId="{0526F32D-0351-45A5-8C58-97CDF2BBDBC1}"/>
     <dgm:cxn modelId="{560BF65C-AD0D-4041-93C6-2D7468398097}" type="presOf" srcId="{583224E0-242D-4CF9-940B-1779D564971F}" destId="{418A27A6-8121-4F59-9426-10E1FE1C78E9}" srcOrd="0" destOrd="0" presId="urn:microsoft.com/office/officeart/2005/8/layout/hierarchy6"/>
-    <dgm:cxn modelId="{2C068AE6-5FDC-42B9-9F15-0888942DAA6C}" type="presOf" srcId="{4CE06E46-0714-452F-AB24-C9C05FFE475F}" destId="{5B4AD018-BEC7-46A6-BFBC-118D8896C537}" srcOrd="0" destOrd="0" presId="urn:microsoft.com/office/officeart/2005/8/layout/hierarchy6"/>
-    <dgm:cxn modelId="{0E20935C-88AB-426B-93A9-8EACFC29B4FB}" type="presOf" srcId="{763F464C-1A9B-4A8A-BBB6-CB85F5083C00}" destId="{78EA99FF-4FA2-482F-8478-CCDBA0159D67}" srcOrd="0" destOrd="0" presId="urn:microsoft.com/office/officeart/2005/8/layout/hierarchy6"/>
-    <dgm:cxn modelId="{336CE55B-E69B-4A70-9FED-DF098EEB8F18}" type="presOf" srcId="{FD73C3F3-1040-499D-ABEC-3E04D9DB5441}" destId="{F2DC642D-F30C-4F22-98F6-87945A798FC4}" srcOrd="0" destOrd="0" presId="urn:microsoft.com/office/officeart/2005/8/layout/hierarchy6"/>
-    <dgm:cxn modelId="{E690E5FF-D529-4151-883F-89EFA40BE88B}" type="presOf" srcId="{58EF9AEA-4A68-40BD-8934-D010E5ED107A}" destId="{54098387-CD4E-41A7-A8E9-76A35EBCE9BA}" srcOrd="0" destOrd="0" presId="urn:microsoft.com/office/officeart/2005/8/layout/hierarchy6"/>
-    <dgm:cxn modelId="{EE40F654-9D87-4E83-B494-60F2C000A83C}" type="presOf" srcId="{81ECDEF2-4B90-4768-BA63-4BE734E93C77}" destId="{006A664B-44BF-4E5B-A677-CF3BD8119446}" srcOrd="0" destOrd="0" presId="urn:microsoft.com/office/officeart/2005/8/layout/hierarchy6"/>
-    <dgm:cxn modelId="{473726D2-58DC-41A3-A382-34640E5FAD24}" type="presOf" srcId="{C8EF2319-5CDE-412F-8FF3-46525236DB5F}" destId="{26A3F8A9-98B3-4798-BA80-C92EABA10744}" srcOrd="0" destOrd="0" presId="urn:microsoft.com/office/officeart/2005/8/layout/hierarchy6"/>
-    <dgm:cxn modelId="{F77E2EA7-08B3-4134-A622-654B7F840859}" srcId="{81ECDEF2-4B90-4768-BA63-4BE734E93C77}" destId="{EA4E1945-2735-48C0-B456-38029D16B9F1}" srcOrd="1" destOrd="0" parTransId="{583224E0-242D-4CF9-940B-1779D564971F}" sibTransId="{B88E4A3A-A473-4AC4-BF58-42ECF85E90DF}"/>
-    <dgm:cxn modelId="{D4C6D084-DB23-4191-8A19-EF17E884F501}" srcId="{763F464C-1A9B-4A8A-BBB6-CB85F5083C00}" destId="{EC5B3B17-A8F1-4BF2-9088-0A1C3FFB265D}" srcOrd="1" destOrd="0" parTransId="{B6F1ECDF-70D7-40BD-83E0-7627B277D4C7}" sibTransId="{F65A7FA6-6F98-43F7-861D-03FD77F0B23A}"/>
     <dgm:cxn modelId="{4E80E8C5-DC9C-4FC5-8D7E-D97479D4F695}" srcId="{4CE06E46-0714-452F-AB24-C9C05FFE475F}" destId="{763F464C-1A9B-4A8A-BBB6-CB85F5083C00}" srcOrd="0" destOrd="0" parTransId="{A5FC00B1-5AC9-4694-92A2-A3073E74A651}" sibTransId="{9C5608EC-5095-4096-9C8C-81C0FA9CE8FA}"/>
     <dgm:cxn modelId="{FC38CD49-41DA-4280-B639-85FC40E54F84}" type="presOf" srcId="{A5FC00B1-5AC9-4694-92A2-A3073E74A651}" destId="{4D53EF7D-419E-47BC-BBFB-313FD2720112}" srcOrd="0" destOrd="0" presId="urn:microsoft.com/office/officeart/2005/8/layout/hierarchy6"/>
-    <dgm:cxn modelId="{1D96B10F-EFF9-489F-8EBE-A6DFAFD05C7A}" type="presOf" srcId="{42ED6FD1-9063-4FF4-B4E1-2D6CD09707DD}" destId="{D4A3543C-64F3-45AE-A144-EA2456DD0AF1}" srcOrd="0" destOrd="0" presId="urn:microsoft.com/office/officeart/2005/8/layout/hierarchy6"/>
     <dgm:cxn modelId="{2ACB89B8-2886-4A28-A425-5941C883C7F4}" type="presOf" srcId="{5AC97B45-D950-4BA7-828F-A82426FC621B}" destId="{C01708EB-26B6-43BA-87B1-1939BC4E11A4}" srcOrd="0" destOrd="0" presId="urn:microsoft.com/office/officeart/2005/8/layout/hierarchy6"/>
+    <dgm:cxn modelId="{EE40F654-9D87-4E83-B494-60F2C000A83C}" type="presOf" srcId="{81ECDEF2-4B90-4768-BA63-4BE734E93C77}" destId="{006A664B-44BF-4E5B-A677-CF3BD8119446}" srcOrd="0" destOrd="0" presId="urn:microsoft.com/office/officeart/2005/8/layout/hierarchy6"/>
+    <dgm:cxn modelId="{16113D55-7A48-4324-A443-B1D4F1CA8550}" type="presOf" srcId="{EC5B3B17-A8F1-4BF2-9088-0A1C3FFB265D}" destId="{4126711B-B9E8-4AEE-9BCA-454D5ACBC510}" srcOrd="0" destOrd="0" presId="urn:microsoft.com/office/officeart/2005/8/layout/hierarchy6"/>
+    <dgm:cxn modelId="{473726D2-58DC-41A3-A382-34640E5FAD24}" type="presOf" srcId="{C8EF2319-5CDE-412F-8FF3-46525236DB5F}" destId="{26A3F8A9-98B3-4798-BA80-C92EABA10744}" srcOrd="0" destOrd="0" presId="urn:microsoft.com/office/officeart/2005/8/layout/hierarchy6"/>
+    <dgm:cxn modelId="{9D1D3F87-EE15-418C-92B0-CFD84D1387D8}" srcId="{763F464C-1A9B-4A8A-BBB6-CB85F5083C00}" destId="{FD73C3F3-1040-499D-ABEC-3E04D9DB5441}" srcOrd="3" destOrd="0" parTransId="{66275E6C-84CD-4888-8FF9-934066A7EB89}" sibTransId="{24839A10-A5D2-4CE4-B46E-4667FD181F9A}"/>
+    <dgm:cxn modelId="{E690E5FF-D529-4151-883F-89EFA40BE88B}" type="presOf" srcId="{58EF9AEA-4A68-40BD-8934-D010E5ED107A}" destId="{54098387-CD4E-41A7-A8E9-76A35EBCE9BA}" srcOrd="0" destOrd="0" presId="urn:microsoft.com/office/officeart/2005/8/layout/hierarchy6"/>
+    <dgm:cxn modelId="{B86D4BA7-5F4D-423B-9CE5-F46B90DF2668}" srcId="{763F464C-1A9B-4A8A-BBB6-CB85F5083C00}" destId="{C8EF2319-5CDE-412F-8FF3-46525236DB5F}" srcOrd="2" destOrd="0" parTransId="{9C68AB92-3C8E-4E65-AC59-F9379CAB2C55}" sibTransId="{B57940C5-A2F6-4FBA-BF5B-82E5ED08771E}"/>
+    <dgm:cxn modelId="{0CBAC925-1F3C-4588-9C7A-F8397A5B90F7}" type="presOf" srcId="{9C33CFCA-6F5C-4680-9DBE-7CEAF0BA519D}" destId="{DBD886C5-46CD-46C1-AD1C-B39755644582}" srcOrd="0" destOrd="0" presId="urn:microsoft.com/office/officeart/2005/8/layout/hierarchy6"/>
     <dgm:cxn modelId="{DAB45A5A-C6D9-4B9F-AA28-DAE17AF83FF0}" type="presOf" srcId="{66275E6C-84CD-4888-8FF9-934066A7EB89}" destId="{6227A3C8-2209-47E3-AC60-C97584B50E73}" srcOrd="0" destOrd="0" presId="urn:microsoft.com/office/officeart/2005/8/layout/hierarchy6"/>
-    <dgm:cxn modelId="{3C5A41EA-DFC1-4E69-BB31-57A05A8ECB21}" type="presOf" srcId="{8B6DCE7E-8550-4F5F-9BA2-6ADCF23123CD}" destId="{56443105-A1ED-44FC-B993-AAA239C42BF6}" srcOrd="0" destOrd="0" presId="urn:microsoft.com/office/officeart/2005/8/layout/hierarchy6"/>
+    <dgm:cxn modelId="{336CE55B-E69B-4A70-9FED-DF098EEB8F18}" type="presOf" srcId="{FD73C3F3-1040-499D-ABEC-3E04D9DB5441}" destId="{F2DC642D-F30C-4F22-98F6-87945A798FC4}" srcOrd="0" destOrd="0" presId="urn:microsoft.com/office/officeart/2005/8/layout/hierarchy6"/>
     <dgm:cxn modelId="{7F0CF8D8-AF45-4968-8A65-3391B28BDD61}" type="presOf" srcId="{9C68AB92-3C8E-4E65-AC59-F9379CAB2C55}" destId="{787181F8-5A63-431D-85F7-58B8315AD782}" srcOrd="0" destOrd="0" presId="urn:microsoft.com/office/officeart/2005/8/layout/hierarchy6"/>
+    <dgm:cxn modelId="{2C068AE6-5FDC-42B9-9F15-0888942DAA6C}" type="presOf" srcId="{4CE06E46-0714-452F-AB24-C9C05FFE475F}" destId="{5B4AD018-BEC7-46A6-BFBC-118D8896C537}" srcOrd="0" destOrd="0" presId="urn:microsoft.com/office/officeart/2005/8/layout/hierarchy6"/>
+    <dgm:cxn modelId="{8384144A-B81E-4F5B-9A5A-E1BBF490E4D3}" srcId="{81ECDEF2-4B90-4768-BA63-4BE734E93C77}" destId="{4E048086-5913-4F96-8238-CBE7DCDA6106}" srcOrd="0" destOrd="0" parTransId="{9C33CFCA-6F5C-4680-9DBE-7CEAF0BA519D}" sibTransId="{CF857031-F749-434F-AF3D-678006DA4923}"/>
+    <dgm:cxn modelId="{7058D5B4-F489-4869-AC85-A34387064222}" type="presOf" srcId="{EA4E1945-2735-48C0-B456-38029D16B9F1}" destId="{20ABA8FC-D466-427C-969F-B02B57D42E63}" srcOrd="0" destOrd="0" presId="urn:microsoft.com/office/officeart/2005/8/layout/hierarchy6"/>
+    <dgm:cxn modelId="{37F254C9-B8FE-4225-BE17-BA848CA246DC}" type="presOf" srcId="{4E048086-5913-4F96-8238-CBE7DCDA6106}" destId="{D8E10F95-5756-4BAE-9CE6-4C01BEB7C029}" srcOrd="0" destOrd="0" presId="urn:microsoft.com/office/officeart/2005/8/layout/hierarchy6"/>
     <dgm:cxn modelId="{87A63F06-F937-4F71-BB26-2BAB8CDB24F8}" srcId="{81ECDEF2-4B90-4768-BA63-4BE734E93C77}" destId="{4CE06E46-0714-452F-AB24-C9C05FFE475F}" srcOrd="2" destOrd="0" parTransId="{1F18CF45-9EFF-4272-974C-667D3755D4F6}" sibTransId="{C1DEE18B-A183-474E-99D8-161BC619A018}"/>
-    <dgm:cxn modelId="{9D1D3F87-EE15-418C-92B0-CFD84D1387D8}" srcId="{763F464C-1A9B-4A8A-BBB6-CB85F5083C00}" destId="{FD73C3F3-1040-499D-ABEC-3E04D9DB5441}" srcOrd="3" destOrd="0" parTransId="{66275E6C-84CD-4888-8FF9-934066A7EB89}" sibTransId="{24839A10-A5D2-4CE4-B46E-4667FD181F9A}"/>
     <dgm:cxn modelId="{91441CA7-78C8-4A6B-A808-ADE27D701643}" srcId="{763F464C-1A9B-4A8A-BBB6-CB85F5083C00}" destId="{4E7D3B01-FC5C-43ED-802E-A887796C0252}" srcOrd="0" destOrd="0" parTransId="{42ED6FD1-9063-4FF4-B4E1-2D6CD09707DD}" sibTransId="{59C90DA1-345D-43DE-B9CB-D6B7CD68784C}"/>
-    <dgm:cxn modelId="{F76B0E3F-AE77-482F-9725-C4252CD73107}" srcId="{4CE06E46-0714-452F-AB24-C9C05FFE475F}" destId="{58EF9AEA-4A68-40BD-8934-D010E5ED107A}" srcOrd="1" destOrd="0" parTransId="{8B6DCE7E-8550-4F5F-9BA2-6ADCF23123CD}" sibTransId="{0526F32D-0351-45A5-8C58-97CDF2BBDBC1}"/>
-    <dgm:cxn modelId="{36996426-A526-4EF6-87C6-58D4AE717C3A}" srcId="{5AC97B45-D950-4BA7-828F-A82426FC621B}" destId="{81ECDEF2-4B90-4768-BA63-4BE734E93C77}" srcOrd="0" destOrd="0" parTransId="{B7B25871-225C-4884-8BEC-F9D608D91BB7}" sibTransId="{35E406F7-85DC-4D39-89B1-D3DD2C583D5A}"/>
-    <dgm:cxn modelId="{B86D4BA7-5F4D-423B-9CE5-F46B90DF2668}" srcId="{763F464C-1A9B-4A8A-BBB6-CB85F5083C00}" destId="{C8EF2319-5CDE-412F-8FF3-46525236DB5F}" srcOrd="2" destOrd="0" parTransId="{9C68AB92-3C8E-4E65-AC59-F9379CAB2C55}" sibTransId="{B57940C5-A2F6-4FBA-BF5B-82E5ED08771E}"/>
-    <dgm:cxn modelId="{7058D5B4-F489-4869-AC85-A34387064222}" type="presOf" srcId="{EA4E1945-2735-48C0-B456-38029D16B9F1}" destId="{20ABA8FC-D466-427C-969F-B02B57D42E63}" srcOrd="0" destOrd="0" presId="urn:microsoft.com/office/officeart/2005/8/layout/hierarchy6"/>
-    <dgm:cxn modelId="{8384144A-B81E-4F5B-9A5A-E1BBF490E4D3}" srcId="{81ECDEF2-4B90-4768-BA63-4BE734E93C77}" destId="{4E048086-5913-4F96-8238-CBE7DCDA6106}" srcOrd="0" destOrd="0" parTransId="{9C33CFCA-6F5C-4680-9DBE-7CEAF0BA519D}" sibTransId="{CF857031-F749-434F-AF3D-678006DA4923}"/>
-    <dgm:cxn modelId="{7475B711-D6EB-499C-8DE8-C6298C916C1B}" type="presOf" srcId="{1F18CF45-9EFF-4272-974C-667D3755D4F6}" destId="{0BF74B1C-D790-4892-8A37-2BDDABDAD287}" srcOrd="0" destOrd="0" presId="urn:microsoft.com/office/officeart/2005/8/layout/hierarchy6"/>
-    <dgm:cxn modelId="{16113D55-7A48-4324-A443-B1D4F1CA8550}" type="presOf" srcId="{EC5B3B17-A8F1-4BF2-9088-0A1C3FFB265D}" destId="{4126711B-B9E8-4AEE-9BCA-454D5ACBC510}" srcOrd="0" destOrd="0" presId="urn:microsoft.com/office/officeart/2005/8/layout/hierarchy6"/>
-    <dgm:cxn modelId="{37F254C9-B8FE-4225-BE17-BA848CA246DC}" type="presOf" srcId="{4E048086-5913-4F96-8238-CBE7DCDA6106}" destId="{D8E10F95-5756-4BAE-9CE6-4C01BEB7C029}" srcOrd="0" destOrd="0" presId="urn:microsoft.com/office/officeart/2005/8/layout/hierarchy6"/>
-    <dgm:cxn modelId="{0E656B61-6B5A-451F-93A3-E05F7611F19F}" type="presOf" srcId="{4E7D3B01-FC5C-43ED-802E-A887796C0252}" destId="{D7509E2D-E65E-48EB-B3F9-2FA1D4D7A4AD}" srcOrd="0" destOrd="0" presId="urn:microsoft.com/office/officeart/2005/8/layout/hierarchy6"/>
-    <dgm:cxn modelId="{0CBAC925-1F3C-4588-9C7A-F8397A5B90F7}" type="presOf" srcId="{9C33CFCA-6F5C-4680-9DBE-7CEAF0BA519D}" destId="{DBD886C5-46CD-46C1-AD1C-B39755644582}" srcOrd="0" destOrd="0" presId="urn:microsoft.com/office/officeart/2005/8/layout/hierarchy6"/>
-    <dgm:cxn modelId="{0D67976C-274B-4D2A-B610-2B6ECD925794}" type="presOf" srcId="{B6F1ECDF-70D7-40BD-83E0-7627B277D4C7}" destId="{1D6B99FC-F962-4ED1-92D5-81B5D69A4E76}" srcOrd="0" destOrd="0" presId="urn:microsoft.com/office/officeart/2005/8/layout/hierarchy6"/>
+    <dgm:cxn modelId="{D4C6D084-DB23-4191-8A19-EF17E884F501}" srcId="{763F464C-1A9B-4A8A-BBB6-CB85F5083C00}" destId="{EC5B3B17-A8F1-4BF2-9088-0A1C3FFB265D}" srcOrd="1" destOrd="0" parTransId="{B6F1ECDF-70D7-40BD-83E0-7627B277D4C7}" sibTransId="{F65A7FA6-6F98-43F7-861D-03FD77F0B23A}"/>
     <dgm:cxn modelId="{8C4800D1-1F0C-4EB5-94FC-E543D48EC092}" type="presParOf" srcId="{C01708EB-26B6-43BA-87B1-1939BC4E11A4}" destId="{A5328CC2-7313-45F6-88C9-A7D052A1A823}" srcOrd="0" destOrd="0" presId="urn:microsoft.com/office/officeart/2005/8/layout/hierarchy6"/>
     <dgm:cxn modelId="{E6F11758-4061-4B11-83F5-3148C01F231E}" type="presParOf" srcId="{A5328CC2-7313-45F6-88C9-A7D052A1A823}" destId="{ACB980C3-3EFD-4980-8F6B-DFE2FFD38FAA}" srcOrd="0" destOrd="0" presId="urn:microsoft.com/office/officeart/2005/8/layout/hierarchy6"/>
     <dgm:cxn modelId="{27BCCBE7-9644-4F26-B8BE-ED42A1399BED}" type="presParOf" srcId="{ACB980C3-3EFD-4980-8F6B-DFE2FFD38FAA}" destId="{81E7A7B1-7827-4228-858A-60D10408D2C4}" srcOrd="0" destOrd="0" presId="urn:microsoft.com/office/officeart/2005/8/layout/hierarchy6"/>
@@ -4499,6 +4639,7 @@
           <a:p>
             <a:fld id="{A2E06D36-562D-42A7-9227-944C1DAE814E}" type="datetimeFigureOut">
               <a:rPr lang="en-US" smtClean="0"/>
+              <a:pPr/>
               <a:t>20-Jun-14</a:t>
             </a:fld>
             <a:endParaRPr lang="en-US"/>
@@ -4660,6 +4801,7 @@
           <a:p>
             <a:fld id="{5EDCEB48-4E52-4BE6-A47E-4533D6F9955A}" type="slidenum">
               <a:rPr lang="en-US" smtClean="0"/>
+              <a:pPr/>
               <a:t>‹#›</a:t>
             </a:fld>
             <a:endParaRPr lang="en-US"/>
@@ -8035,11 +8177,7 @@
             </a:r>
             <a:r>
               <a:rPr lang="en-US" dirty="0" smtClean="0"/>
-              <a:t>-classified as a </a:t>
-            </a:r>
-            <a:r>
-              <a:rPr lang="en-US" dirty="0" smtClean="0"/>
-              <a:t>triangle, if directly used.</a:t>
+              <a:t>-classified as a triangle, if directly used.</a:t>
             </a:r>
           </a:p>
           <a:p>

</xml_diff>